<commit_message>
updated course packet and redirect from old website
</commit_message>
<xml_diff>
--- a/static/handouts/ssa200_supplemental-materials.pptx
+++ b/static/handouts/ssa200_supplemental-materials.pptx
@@ -213,7 +213,7 @@
           <a:p>
             <a:fld id="{BFAC87FD-35B9-C849-B94A-A03976F581A2}" type="datetimeFigureOut">
               <a:rPr lang="en-US" smtClean="0"/>
-              <a:t>10/18/2018</a:t>
+              <a:t>12/7/2018</a:t>
             </a:fld>
             <a:endParaRPr lang="en-US"/>
           </a:p>
@@ -611,7 +611,7 @@
           <a:p>
             <a:fld id="{CDB5708F-84DE-6F4A-9412-DD0B527C05D2}" type="datetimeFigureOut">
               <a:rPr lang="en-US" smtClean="0"/>
-              <a:t>10/18/2018</a:t>
+              <a:t>12/7/2018</a:t>
             </a:fld>
             <a:endParaRPr lang="en-US"/>
           </a:p>
@@ -776,7 +776,7 @@
           <a:p>
             <a:fld id="{CDB5708F-84DE-6F4A-9412-DD0B527C05D2}" type="datetimeFigureOut">
               <a:rPr lang="en-US" smtClean="0"/>
-              <a:t>10/18/2018</a:t>
+              <a:t>12/7/2018</a:t>
             </a:fld>
             <a:endParaRPr lang="en-US"/>
           </a:p>
@@ -951,7 +951,7 @@
           <a:p>
             <a:fld id="{CDB5708F-84DE-6F4A-9412-DD0B527C05D2}" type="datetimeFigureOut">
               <a:rPr lang="en-US" smtClean="0"/>
-              <a:t>10/18/2018</a:t>
+              <a:t>12/7/2018</a:t>
             </a:fld>
             <a:endParaRPr lang="en-US"/>
           </a:p>
@@ -1116,7 +1116,7 @@
           <a:p>
             <a:fld id="{CDB5708F-84DE-6F4A-9412-DD0B527C05D2}" type="datetimeFigureOut">
               <a:rPr lang="en-US" smtClean="0"/>
-              <a:t>10/18/2018</a:t>
+              <a:t>12/7/2018</a:t>
             </a:fld>
             <a:endParaRPr lang="en-US"/>
           </a:p>
@@ -1355,7 +1355,7 @@
           <a:p>
             <a:fld id="{CDB5708F-84DE-6F4A-9412-DD0B527C05D2}" type="datetimeFigureOut">
               <a:rPr lang="en-US" smtClean="0"/>
-              <a:t>10/18/2018</a:t>
+              <a:t>12/7/2018</a:t>
             </a:fld>
             <a:endParaRPr lang="en-US"/>
           </a:p>
@@ -1582,7 +1582,7 @@
           <a:p>
             <a:fld id="{CDB5708F-84DE-6F4A-9412-DD0B527C05D2}" type="datetimeFigureOut">
               <a:rPr lang="en-US" smtClean="0"/>
-              <a:t>10/18/2018</a:t>
+              <a:t>12/7/2018</a:t>
             </a:fld>
             <a:endParaRPr lang="en-US"/>
           </a:p>
@@ -1944,7 +1944,7 @@
           <a:p>
             <a:fld id="{CDB5708F-84DE-6F4A-9412-DD0B527C05D2}" type="datetimeFigureOut">
               <a:rPr lang="en-US" smtClean="0"/>
-              <a:t>10/18/2018</a:t>
+              <a:t>12/7/2018</a:t>
             </a:fld>
             <a:endParaRPr lang="en-US"/>
           </a:p>
@@ -2057,7 +2057,7 @@
           <a:p>
             <a:fld id="{CDB5708F-84DE-6F4A-9412-DD0B527C05D2}" type="datetimeFigureOut">
               <a:rPr lang="en-US" smtClean="0"/>
-              <a:t>10/18/2018</a:t>
+              <a:t>12/7/2018</a:t>
             </a:fld>
             <a:endParaRPr lang="en-US"/>
           </a:p>
@@ -2147,7 +2147,7 @@
           <a:p>
             <a:fld id="{CDB5708F-84DE-6F4A-9412-DD0B527C05D2}" type="datetimeFigureOut">
               <a:rPr lang="en-US" smtClean="0"/>
-              <a:t>10/18/2018</a:t>
+              <a:t>12/7/2018</a:t>
             </a:fld>
             <a:endParaRPr lang="en-US"/>
           </a:p>
@@ -2419,7 +2419,7 @@
           <a:p>
             <a:fld id="{CDB5708F-84DE-6F4A-9412-DD0B527C05D2}" type="datetimeFigureOut">
               <a:rPr lang="en-US" smtClean="0"/>
-              <a:t>10/18/2018</a:t>
+              <a:t>12/7/2018</a:t>
             </a:fld>
             <a:endParaRPr lang="en-US"/>
           </a:p>
@@ -2671,7 +2671,7 @@
           <a:p>
             <a:fld id="{CDB5708F-84DE-6F4A-9412-DD0B527C05D2}" type="datetimeFigureOut">
               <a:rPr lang="en-US" smtClean="0"/>
-              <a:t>10/18/2018</a:t>
+              <a:t>12/7/2018</a:t>
             </a:fld>
             <a:endParaRPr lang="en-US"/>
           </a:p>
@@ -2879,7 +2879,7 @@
           <a:p>
             <a:fld id="{CDB5708F-84DE-6F4A-9412-DD0B527C05D2}" type="datetimeFigureOut">
               <a:rPr lang="en-US" smtClean="0"/>
-              <a:t>10/18/2018</a:t>
+              <a:t>12/7/2018</a:t>
             </a:fld>
             <a:endParaRPr lang="en-US"/>
           </a:p>
@@ -3362,17 +3362,7 @@
           </a:lstStyle>
           <a:p>
             <a:pPr algn="r"/>
-            <a:r>
-              <a:rPr lang="en-US" sz="1400" b="1" dirty="0"/>
-              <a:t>Oct 23-24, 2018</a:t>
-            </a:r>
-          </a:p>
-          <a:p>
-            <a:pPr algn="r"/>
-            <a:r>
-              <a:rPr lang="en-US" sz="1400" b="1" dirty="0"/>
-              <a:t>Houston, TX</a:t>
-            </a:r>
+            <a:endParaRPr lang="en-US" sz="1400" b="1" dirty="0"/>
           </a:p>
         </p:txBody>
       </p:sp>
@@ -3475,7 +3465,7 @@
             </a:r>
             <a:r>
               <a:rPr lang="en-US" sz="1200" b="1" dirty="0"/>
-              <a:t>ssa200.github.io</a:t>
+              <a:t>ssa200.auburn.edu</a:t>
             </a:r>
           </a:p>
         </p:txBody>
@@ -12313,7 +12303,7 @@
                   <a:sysClr val="windowText" lastClr="000000"/>
                 </a:solidFill>
               </a:rPr>
-              <a:t>Poisson regression (counts)</a:t>
+              <a:t>Poisson regression</a:t>
             </a:r>
           </a:p>
         </p:txBody>

</xml_diff>